<commit_message>
Word Update Almost Complete
Need to do a read over and add background
</commit_message>
<xml_diff>
--- a/RawFigures/3-1-AOTFGeneralLayout.pptx
+++ b/RawFigures/3-1-AOTFGeneralLayout.pptx
@@ -304,7 +304,7 @@
           <a:p>
             <a:fld id="{B033C8DD-9AB1-4F04-B1BD-7AAB3A71C60C}" type="datetimeFigureOut">
               <a:rPr lang="en-CA" smtClean="0"/>
-              <a:t>17/08/2015</a:t>
+              <a:t>25/08/2015</a:t>
             </a:fld>
             <a:endParaRPr lang="en-CA"/>
           </a:p>
@@ -474,7 +474,7 @@
           <a:p>
             <a:fld id="{B033C8DD-9AB1-4F04-B1BD-7AAB3A71C60C}" type="datetimeFigureOut">
               <a:rPr lang="en-CA" smtClean="0"/>
-              <a:t>17/08/2015</a:t>
+              <a:t>25/08/2015</a:t>
             </a:fld>
             <a:endParaRPr lang="en-CA"/>
           </a:p>
@@ -654,7 +654,7 @@
           <a:p>
             <a:fld id="{B033C8DD-9AB1-4F04-B1BD-7AAB3A71C60C}" type="datetimeFigureOut">
               <a:rPr lang="en-CA" smtClean="0"/>
-              <a:t>17/08/2015</a:t>
+              <a:t>25/08/2015</a:t>
             </a:fld>
             <a:endParaRPr lang="en-CA"/>
           </a:p>
@@ -824,7 +824,7 @@
           <a:p>
             <a:fld id="{B033C8DD-9AB1-4F04-B1BD-7AAB3A71C60C}" type="datetimeFigureOut">
               <a:rPr lang="en-CA" smtClean="0"/>
-              <a:t>17/08/2015</a:t>
+              <a:t>25/08/2015</a:t>
             </a:fld>
             <a:endParaRPr lang="en-CA"/>
           </a:p>
@@ -1070,7 +1070,7 @@
           <a:p>
             <a:fld id="{B033C8DD-9AB1-4F04-B1BD-7AAB3A71C60C}" type="datetimeFigureOut">
               <a:rPr lang="en-CA" smtClean="0"/>
-              <a:t>17/08/2015</a:t>
+              <a:t>25/08/2015</a:t>
             </a:fld>
             <a:endParaRPr lang="en-CA"/>
           </a:p>
@@ -1358,7 +1358,7 @@
           <a:p>
             <a:fld id="{B033C8DD-9AB1-4F04-B1BD-7AAB3A71C60C}" type="datetimeFigureOut">
               <a:rPr lang="en-CA" smtClean="0"/>
-              <a:t>17/08/2015</a:t>
+              <a:t>25/08/2015</a:t>
             </a:fld>
             <a:endParaRPr lang="en-CA"/>
           </a:p>
@@ -1785,7 +1785,7 @@
           <a:p>
             <a:fld id="{B033C8DD-9AB1-4F04-B1BD-7AAB3A71C60C}" type="datetimeFigureOut">
               <a:rPr lang="en-CA" smtClean="0"/>
-              <a:t>17/08/2015</a:t>
+              <a:t>25/08/2015</a:t>
             </a:fld>
             <a:endParaRPr lang="en-CA"/>
           </a:p>
@@ -1903,7 +1903,7 @@
           <a:p>
             <a:fld id="{B033C8DD-9AB1-4F04-B1BD-7AAB3A71C60C}" type="datetimeFigureOut">
               <a:rPr lang="en-CA" smtClean="0"/>
-              <a:t>17/08/2015</a:t>
+              <a:t>25/08/2015</a:t>
             </a:fld>
             <a:endParaRPr lang="en-CA"/>
           </a:p>
@@ -1998,7 +1998,7 @@
           <a:p>
             <a:fld id="{B033C8DD-9AB1-4F04-B1BD-7AAB3A71C60C}" type="datetimeFigureOut">
               <a:rPr lang="en-CA" smtClean="0"/>
-              <a:t>17/08/2015</a:t>
+              <a:t>25/08/2015</a:t>
             </a:fld>
             <a:endParaRPr lang="en-CA"/>
           </a:p>
@@ -2275,7 +2275,7 @@
           <a:p>
             <a:fld id="{B033C8DD-9AB1-4F04-B1BD-7AAB3A71C60C}" type="datetimeFigureOut">
               <a:rPr lang="en-CA" smtClean="0"/>
-              <a:t>17/08/2015</a:t>
+              <a:t>25/08/2015</a:t>
             </a:fld>
             <a:endParaRPr lang="en-CA"/>
           </a:p>
@@ -2528,7 +2528,7 @@
           <a:p>
             <a:fld id="{B033C8DD-9AB1-4F04-B1BD-7AAB3A71C60C}" type="datetimeFigureOut">
               <a:rPr lang="en-CA" smtClean="0"/>
-              <a:t>17/08/2015</a:t>
+              <a:t>25/08/2015</a:t>
             </a:fld>
             <a:endParaRPr lang="en-CA"/>
           </a:p>
@@ -2741,7 +2741,7 @@
           <a:p>
             <a:fld id="{B033C8DD-9AB1-4F04-B1BD-7AAB3A71C60C}" type="datetimeFigureOut">
               <a:rPr lang="en-CA" smtClean="0"/>
-              <a:t>17/08/2015</a:t>
+              <a:t>25/08/2015</a:t>
             </a:fld>
             <a:endParaRPr lang="en-CA"/>
           </a:p>
@@ -3124,7 +3124,7 @@
         </p:nvSpPr>
         <p:spPr>
           <a:xfrm>
-            <a:off x="539800" y="82945"/>
+            <a:off x="719634" y="131337"/>
             <a:ext cx="1656184" cy="1008112"/>
           </a:xfrm>
           <a:prstGeom prst="parallelogram">
@@ -3162,7 +3162,7 @@
         </p:nvSpPr>
         <p:spPr>
           <a:xfrm rot="720013">
-            <a:off x="1280037" y="188557"/>
+            <a:off x="1459871" y="236949"/>
             <a:ext cx="252815" cy="864096"/>
           </a:xfrm>
           <a:prstGeom prst="upArrow">
@@ -3203,7 +3203,7 @@
         </p:nvCxnSpPr>
         <p:spPr>
           <a:xfrm flipV="1">
-            <a:off x="1406444" y="182948"/>
+            <a:off x="1586278" y="231340"/>
             <a:ext cx="1149580" cy="369870"/>
           </a:xfrm>
           <a:prstGeom prst="straightConnector1">
@@ -3236,7 +3236,7 @@
         </p:nvCxnSpPr>
         <p:spPr>
           <a:xfrm>
-            <a:off x="1406444" y="552817"/>
+            <a:off x="1586278" y="601209"/>
             <a:ext cx="1072995" cy="650942"/>
           </a:xfrm>
           <a:prstGeom prst="straightConnector1">
@@ -3269,7 +3269,7 @@
         </p:nvSpPr>
         <p:spPr>
           <a:xfrm>
-            <a:off x="394592" y="1171335"/>
+            <a:off x="574426" y="1219727"/>
             <a:ext cx="1860509" cy="369332"/>
           </a:xfrm>
           <a:prstGeom prst="rect">
@@ -3299,7 +3299,7 @@
         </p:nvSpPr>
         <p:spPr>
           <a:xfrm>
-            <a:off x="2555647" y="-11541"/>
+            <a:off x="2735481" y="36851"/>
             <a:ext cx="1499065" cy="369332"/>
           </a:xfrm>
           <a:prstGeom prst="rect">
@@ -3329,7 +3329,7 @@
         </p:nvCxnSpPr>
         <p:spPr>
           <a:xfrm flipV="1">
-            <a:off x="1406444" y="499381"/>
+            <a:off x="1586278" y="547773"/>
             <a:ext cx="1149203" cy="53436"/>
           </a:xfrm>
           <a:prstGeom prst="straightConnector1">
@@ -3362,7 +3362,7 @@
         </p:nvSpPr>
         <p:spPr>
           <a:xfrm>
-            <a:off x="2521045" y="295650"/>
+            <a:off x="2700879" y="344042"/>
             <a:ext cx="1716432" cy="369332"/>
           </a:xfrm>
           <a:prstGeom prst="rect">
@@ -3392,7 +3392,7 @@
         </p:nvSpPr>
         <p:spPr>
           <a:xfrm>
-            <a:off x="2479439" y="615349"/>
+            <a:off x="2659273" y="663741"/>
             <a:ext cx="1716432" cy="369332"/>
           </a:xfrm>
           <a:prstGeom prst="rect">
@@ -3422,7 +3422,7 @@
         </p:nvSpPr>
         <p:spPr>
           <a:xfrm>
-            <a:off x="2458303" y="1023938"/>
+            <a:off x="2638137" y="1072330"/>
             <a:ext cx="1499065" cy="369332"/>
           </a:xfrm>
           <a:prstGeom prst="rect">
@@ -3452,7 +3452,7 @@
         </p:nvCxnSpPr>
         <p:spPr>
           <a:xfrm>
-            <a:off x="1406444" y="552816"/>
+            <a:off x="1586278" y="601208"/>
             <a:ext cx="1149580" cy="248298"/>
           </a:xfrm>
           <a:prstGeom prst="straightConnector1">
@@ -3485,7 +3485,7 @@
         </p:nvCxnSpPr>
         <p:spPr>
           <a:xfrm flipH="1">
-            <a:off x="215578" y="552816"/>
+            <a:off x="395412" y="601208"/>
             <a:ext cx="1190489" cy="0"/>
           </a:xfrm>
           <a:prstGeom prst="line">
@@ -3512,6 +3512,79 @@
           </a:fontRef>
         </p:style>
       </p:cxnSp>
+      <p:cxnSp>
+        <p:nvCxnSpPr>
+          <p:cNvPr id="3" name="Straight Arrow Connector 2"/>
+          <p:cNvCxnSpPr/>
+          <p:nvPr/>
+        </p:nvCxnSpPr>
+        <p:spPr>
+          <a:xfrm>
+            <a:off x="17060" y="601208"/>
+            <a:ext cx="827460" cy="0"/>
+          </a:xfrm>
+          <a:prstGeom prst="straightConnector1">
+            <a:avLst/>
+          </a:prstGeom>
+          <a:ln>
+            <a:solidFill>
+              <a:schemeClr val="tx1"/>
+            </a:solidFill>
+            <a:headEnd type="none" w="med" len="med"/>
+            <a:tailEnd type="arrow" w="med" len="med"/>
+          </a:ln>
+        </p:spPr>
+        <p:style>
+          <a:lnRef idx="1">
+            <a:schemeClr val="accent1"/>
+          </a:lnRef>
+          <a:fillRef idx="0">
+            <a:schemeClr val="accent1"/>
+          </a:fillRef>
+          <a:effectRef idx="0">
+            <a:schemeClr val="accent1"/>
+          </a:effectRef>
+          <a:fontRef idx="minor">
+            <a:schemeClr val="tx1"/>
+          </a:fontRef>
+        </p:style>
+      </p:cxnSp>
+      <p:sp>
+        <p:nvSpPr>
+          <p:cNvPr id="16" name="TextBox 15"/>
+          <p:cNvSpPr txBox="1"/>
+          <p:nvPr/>
+        </p:nvSpPr>
+        <p:spPr>
+          <a:xfrm>
+            <a:off x="-9305" y="-75831"/>
+            <a:ext cx="948786" cy="646331"/>
+          </a:xfrm>
+          <a:prstGeom prst="rect">
+            <a:avLst/>
+          </a:prstGeom>
+          <a:noFill/>
+        </p:spPr>
+        <p:txBody>
+          <a:bodyPr wrap="none" rtlCol="0">
+            <a:spAutoFit/>
+          </a:bodyPr>
+          <a:lstStyle/>
+          <a:p>
+            <a:r>
+              <a:rPr lang="en-CA" dirty="0" smtClean="0"/>
+              <a:t>Incident</a:t>
+            </a:r>
+          </a:p>
+          <a:p>
+            <a:r>
+              <a:rPr lang="en-CA" dirty="0" smtClean="0"/>
+              <a:t>Ray</a:t>
+            </a:r>
+            <a:endParaRPr lang="en-CA" dirty="0"/>
+          </a:p>
+        </p:txBody>
+      </p:sp>
     </p:spTree>
     <p:extLst>
       <p:ext uri="{BB962C8B-B14F-4D97-AF65-F5344CB8AC3E}">

</xml_diff>